<commit_message>
task: add web application
</commit_message>
<xml_diff>
--- a/Presentation.pptx
+++ b/Presentation.pptx
@@ -230,7 +230,7 @@
               <a:rPr lang="en-US" smtClean="0">
                 <a:latin typeface="Tw Cen MT" panose="020B0602020104020603" pitchFamily="34" charset="0"/>
               </a:rPr>
-              <a:t>7/5/2021</a:t>
+              <a:t>7/6/2021</a:t>
             </a:fld>
             <a:endParaRPr lang="en-US" dirty="0">
               <a:latin typeface="Tw Cen MT" panose="020B0602020104020603" pitchFamily="34" charset="0"/>
@@ -420,7 +420,7 @@
             <a:fld id="{AF4A386A-BFE4-4655-9801-CBB04655F27A}" type="datetimeFigureOut">
               <a:rPr lang="en-US" noProof="0" smtClean="0"/>
               <a:pPr/>
-              <a:t>7/5/2021</a:t>
+              <a:t>7/6/2021</a:t>
             </a:fld>
             <a:endParaRPr lang="en-US" noProof="0" dirty="0"/>
           </a:p>
@@ -32047,7 +32047,7 @@
         <p:spPr>
           <a:xfrm>
             <a:off x="551848" y="1698486"/>
-            <a:ext cx="6696280" cy="3170674"/>
+            <a:ext cx="6696280" cy="3818746"/>
           </a:xfrm>
           <a:prstGeom prst="rect">
             <a:avLst/>
@@ -32326,6 +32326,27 @@
               </a:rPr>
               <a:t>https://flexboxfroggy.com/</a:t>
             </a:r>
+            <a:endParaRPr lang="en-US" dirty="0"/>
+          </a:p>
+          <a:p>
+            <a:r>
+              <a:rPr lang="en-US" dirty="0">
+                <a:hlinkClick r:id="rId9"/>
+              </a:rPr>
+              <a:t>https://www.w3schools.com/js/</a:t>
+            </a:r>
+            <a:endParaRPr lang="en-US" dirty="0"/>
+          </a:p>
+          <a:p>
+            <a:r>
+              <a:rPr lang="en-US" dirty="0">
+                <a:hlinkClick r:id="rId10"/>
+              </a:rPr>
+              <a:t>https://docs.microsoft.com/en-us/aspnet/core/razor-pages/?view=aspnetcore-5.0&amp;tabs=visual-studio</a:t>
+            </a:r>
+            <a:endParaRPr lang="en-US" dirty="0"/>
+          </a:p>
+          <a:p>
             <a:endParaRPr lang="en-US" dirty="0"/>
           </a:p>
         </p:txBody>
@@ -34784,21 +34805,21 @@
 </file>
 
 <file path=customXml/item2.xml><?xml version="1.0" encoding="utf-8"?>
+<p:properties xmlns:p="http://schemas.microsoft.com/office/2006/metadata/properties" xmlns:xsi="http://www.w3.org/2001/XMLSchema-instance" xmlns:pc="http://schemas.microsoft.com/office/infopath/2007/PartnerControls">
+  <documentManagement>
+    <Status xmlns="71af3243-3dd4-4a8d-8c0d-dd76da1f02a5">Not started</Status>
+    <MediaServiceKeyPoints xmlns="71af3243-3dd4-4a8d-8c0d-dd76da1f02a5" xsi:nil="true"/>
+  </documentManagement>
+</p:properties>
+</file>
+
+<file path=customXml/item3.xml><?xml version="1.0" encoding="utf-8"?>
 <?mso-contentType ?>
 <FormTemplates xmlns="http://schemas.microsoft.com/sharepoint/v3/contenttype/forms">
   <Display>DocumentLibraryForm</Display>
   <Edit>DocumentLibraryForm</Edit>
   <New>DocumentLibraryForm</New>
 </FormTemplates>
-</file>
-
-<file path=customXml/item3.xml><?xml version="1.0" encoding="utf-8"?>
-<p:properties xmlns:p="http://schemas.microsoft.com/office/2006/metadata/properties" xmlns:xsi="http://www.w3.org/2001/XMLSchema-instance" xmlns:pc="http://schemas.microsoft.com/office/infopath/2007/PartnerControls">
-  <documentManagement>
-    <Status xmlns="71af3243-3dd4-4a8d-8c0d-dd76da1f02a5">Not started</Status>
-    <MediaServiceKeyPoints xmlns="71af3243-3dd4-4a8d-8c0d-dd76da1f02a5" xsi:nil="true"/>
-  </documentManagement>
-</p:properties>
 </file>
 
 <file path=customXml/itemProps1.xml><?xml version="1.0" encoding="utf-8"?>
@@ -34821,14 +34842,6 @@
 </file>
 
 <file path=customXml/itemProps2.xml><?xml version="1.0" encoding="utf-8"?>
-<ds:datastoreItem xmlns:ds="http://schemas.openxmlformats.org/officeDocument/2006/customXml" ds:itemID="{8106BD98-E608-40A1-98A8-93D5976215CA}">
-  <ds:schemaRefs>
-    <ds:schemaRef ds:uri="http://schemas.microsoft.com/sharepoint/v3/contenttype/forms"/>
-  </ds:schemaRefs>
-</ds:datastoreItem>
-</file>
-
-<file path=customXml/itemProps3.xml><?xml version="1.0" encoding="utf-8"?>
 <ds:datastoreItem xmlns:ds="http://schemas.openxmlformats.org/officeDocument/2006/customXml" ds:itemID="{6A86D9CC-0D9D-4BFE-B3F3-26F480BF8C8A}">
   <ds:schemaRefs>
     <ds:schemaRef ds:uri="http://schemas.microsoft.com/office/2006/metadata/properties"/>
@@ -34836,4 +34849,12 @@
     <ds:schemaRef ds:uri="71af3243-3dd4-4a8d-8c0d-dd76da1f02a5"/>
   </ds:schemaRefs>
 </ds:datastoreItem>
+</file>
+
+<file path=customXml/itemProps3.xml><?xml version="1.0" encoding="utf-8"?>
+<ds:datastoreItem xmlns:ds="http://schemas.openxmlformats.org/officeDocument/2006/customXml" ds:itemID="{8106BD98-E608-40A1-98A8-93D5976215CA}">
+  <ds:schemaRefs>
+    <ds:schemaRef ds:uri="http://schemas.microsoft.com/sharepoint/v3/contenttype/forms"/>
+  </ds:schemaRefs>
+</ds:datastoreItem>
 </file>
</xml_diff>